<commit_message>
Dysion update by company pc
</commit_message>
<xml_diff>
--- a/无尽之巢策划案.pptx
+++ b/无尽之巢策划案.pptx
@@ -14,6 +14,8 @@
     <p:sldId id="264" r:id="rId8"/>
     <p:sldId id="265" r:id="rId9"/>
     <p:sldId id="263" r:id="rId10"/>
+    <p:sldId id="267" r:id="rId11"/>
+    <p:sldId id="266" r:id="rId12"/>
   </p:sldIdLst>
   <p:sldSz cx="9144000" cy="6858000" type="screen4x3"/>
   <p:notesSz cx="6858000" cy="9144000"/>
@@ -296,7 +298,7 @@
           <a:p>
             <a:fld id="{530820CF-B880-4189-942D-D702A7CBA730}" type="datetimeFigureOut">
               <a:rPr lang="zh-CN" altLang="en-US" smtClean="0"/>
-              <a:t>2014/10/13</a:t>
+              <a:t>2014/10/15</a:t>
             </a:fld>
             <a:endParaRPr lang="zh-CN" altLang="en-US"/>
           </a:p>
@@ -461,7 +463,7 @@
           <a:p>
             <a:fld id="{530820CF-B880-4189-942D-D702A7CBA730}" type="datetimeFigureOut">
               <a:rPr lang="zh-CN" altLang="en-US" smtClean="0"/>
-              <a:t>2014/10/13</a:t>
+              <a:t>2014/10/15</a:t>
             </a:fld>
             <a:endParaRPr lang="zh-CN" altLang="en-US"/>
           </a:p>
@@ -636,7 +638,7 @@
           <a:p>
             <a:fld id="{530820CF-B880-4189-942D-D702A7CBA730}" type="datetimeFigureOut">
               <a:rPr lang="zh-CN" altLang="en-US" smtClean="0"/>
-              <a:t>2014/10/13</a:t>
+              <a:t>2014/10/15</a:t>
             </a:fld>
             <a:endParaRPr lang="zh-CN" altLang="en-US"/>
           </a:p>
@@ -801,7 +803,7 @@
           <a:p>
             <a:fld id="{530820CF-B880-4189-942D-D702A7CBA730}" type="datetimeFigureOut">
               <a:rPr lang="zh-CN" altLang="en-US" smtClean="0"/>
-              <a:t>2014/10/13</a:t>
+              <a:t>2014/10/15</a:t>
             </a:fld>
             <a:endParaRPr lang="zh-CN" altLang="en-US"/>
           </a:p>
@@ -1042,7 +1044,7 @@
           <a:p>
             <a:fld id="{530820CF-B880-4189-942D-D702A7CBA730}" type="datetimeFigureOut">
               <a:rPr lang="zh-CN" altLang="en-US" smtClean="0"/>
-              <a:t>2014/10/13</a:t>
+              <a:t>2014/10/15</a:t>
             </a:fld>
             <a:endParaRPr lang="zh-CN" altLang="en-US"/>
           </a:p>
@@ -1325,7 +1327,7 @@
           <a:p>
             <a:fld id="{530820CF-B880-4189-942D-D702A7CBA730}" type="datetimeFigureOut">
               <a:rPr lang="zh-CN" altLang="en-US" smtClean="0"/>
-              <a:t>2014/10/13</a:t>
+              <a:t>2014/10/15</a:t>
             </a:fld>
             <a:endParaRPr lang="zh-CN" altLang="en-US"/>
           </a:p>
@@ -1742,7 +1744,7 @@
           <a:p>
             <a:fld id="{530820CF-B880-4189-942D-D702A7CBA730}" type="datetimeFigureOut">
               <a:rPr lang="zh-CN" altLang="en-US" smtClean="0"/>
-              <a:t>2014/10/13</a:t>
+              <a:t>2014/10/15</a:t>
             </a:fld>
             <a:endParaRPr lang="zh-CN" altLang="en-US"/>
           </a:p>
@@ -1855,7 +1857,7 @@
           <a:p>
             <a:fld id="{530820CF-B880-4189-942D-D702A7CBA730}" type="datetimeFigureOut">
               <a:rPr lang="zh-CN" altLang="en-US" smtClean="0"/>
-              <a:t>2014/10/13</a:t>
+              <a:t>2014/10/15</a:t>
             </a:fld>
             <a:endParaRPr lang="zh-CN" altLang="en-US"/>
           </a:p>
@@ -1945,7 +1947,7 @@
           <a:p>
             <a:fld id="{530820CF-B880-4189-942D-D702A7CBA730}" type="datetimeFigureOut">
               <a:rPr lang="zh-CN" altLang="en-US" smtClean="0"/>
-              <a:t>2014/10/13</a:t>
+              <a:t>2014/10/15</a:t>
             </a:fld>
             <a:endParaRPr lang="zh-CN" altLang="en-US"/>
           </a:p>
@@ -2217,7 +2219,7 @@
           <a:p>
             <a:fld id="{530820CF-B880-4189-942D-D702A7CBA730}" type="datetimeFigureOut">
               <a:rPr lang="zh-CN" altLang="en-US" smtClean="0"/>
-              <a:t>2014/10/13</a:t>
+              <a:t>2014/10/15</a:t>
             </a:fld>
             <a:endParaRPr lang="zh-CN" altLang="en-US"/>
           </a:p>
@@ -2465,7 +2467,7 @@
           <a:p>
             <a:fld id="{530820CF-B880-4189-942D-D702A7CBA730}" type="datetimeFigureOut">
               <a:rPr lang="zh-CN" altLang="en-US" smtClean="0"/>
-              <a:t>2014/10/13</a:t>
+              <a:t>2014/10/15</a:t>
             </a:fld>
             <a:endParaRPr lang="zh-CN" altLang="en-US"/>
           </a:p>
@@ -2673,7 +2675,7 @@
           <a:p>
             <a:fld id="{530820CF-B880-4189-942D-D702A7CBA730}" type="datetimeFigureOut">
               <a:rPr lang="zh-CN" altLang="en-US" smtClean="0"/>
-              <a:t>2014/10/13</a:t>
+              <a:t>2014/10/15</a:t>
             </a:fld>
             <a:endParaRPr lang="zh-CN" altLang="en-US"/>
           </a:p>
@@ -3118,6 +3120,194 @@
 </p:sld>
 </file>
 
+<file path=ppt/slides/slide10.xml><?xml version="1.0" encoding="utf-8"?>
+<p:sld xmlns:a="http://schemas.openxmlformats.org/drawingml/2006/main" xmlns:r="http://schemas.openxmlformats.org/officeDocument/2006/relationships" xmlns:p="http://schemas.openxmlformats.org/presentationml/2006/main">
+  <p:cSld>
+    <p:spTree>
+      <p:nvGrpSpPr>
+        <p:cNvPr id="1" name=""/>
+        <p:cNvGrpSpPr/>
+        <p:nvPr/>
+      </p:nvGrpSpPr>
+      <p:grpSpPr>
+        <a:xfrm>
+          <a:off x="0" y="0"/>
+          <a:ext cx="0" cy="0"/>
+          <a:chOff x="0" y="0"/>
+          <a:chExt cx="0" cy="0"/>
+        </a:xfrm>
+      </p:grpSpPr>
+      <p:sp>
+        <p:nvSpPr>
+          <p:cNvPr id="4" name="标题 1"/>
+          <p:cNvSpPr>
+            <a:spLocks noGrp="1"/>
+          </p:cNvSpPr>
+          <p:nvPr>
+            <p:ph type="title"/>
+          </p:nvPr>
+        </p:nvSpPr>
+        <p:spPr>
+          <a:xfrm>
+            <a:off x="457200" y="274638"/>
+            <a:ext cx="8229600" cy="850106"/>
+          </a:xfrm>
+        </p:spPr>
+        <p:txBody>
+          <a:bodyPr/>
+          <a:lstStyle/>
+          <a:p>
+            <a:r>
+              <a:rPr lang="zh-CN" altLang="en-US" dirty="0"/>
+              <a:t>九</a:t>
+            </a:r>
+            <a:r>
+              <a:rPr lang="zh-CN" altLang="en-US" dirty="0" smtClean="0"/>
+              <a:t>、游戏特效</a:t>
+            </a:r>
+            <a:endParaRPr lang="zh-CN" altLang="en-US" dirty="0"/>
+          </a:p>
+        </p:txBody>
+      </p:sp>
+      <p:sp>
+        <p:nvSpPr>
+          <p:cNvPr id="3" name="TextBox 2"/>
+          <p:cNvSpPr txBox="1"/>
+          <p:nvPr/>
+        </p:nvSpPr>
+        <p:spPr>
+          <a:xfrm>
+            <a:off x="4139952" y="1101092"/>
+            <a:ext cx="4608511" cy="1200329"/>
+          </a:xfrm>
+          <a:prstGeom prst="rect">
+            <a:avLst/>
+          </a:prstGeom>
+          <a:noFill/>
+        </p:spPr>
+        <p:txBody>
+          <a:bodyPr wrap="square" rtlCol="0">
+            <a:spAutoFit/>
+          </a:bodyPr>
+          <a:lstStyle/>
+          <a:p>
+            <a:r>
+              <a:rPr lang="zh-CN" altLang="en-US" dirty="0" smtClean="0"/>
+              <a:t>需要优化的特效</a:t>
+            </a:r>
+            <a:endParaRPr lang="en-US" altLang="zh-CN" dirty="0" smtClean="0"/>
+          </a:p>
+          <a:p>
+            <a:r>
+              <a:rPr lang="en-US" altLang="zh-CN" dirty="0" smtClean="0"/>
+              <a:t>1.</a:t>
+            </a:r>
+            <a:r>
+              <a:rPr lang="zh-CN" altLang="en-US" dirty="0" smtClean="0"/>
+              <a:t>炸弹爆炸特效</a:t>
+            </a:r>
+            <a:endParaRPr lang="en-US" altLang="zh-CN" dirty="0" smtClean="0"/>
+          </a:p>
+          <a:p>
+            <a:r>
+              <a:rPr lang="en-US" altLang="zh-CN" dirty="0" smtClean="0"/>
+              <a:t>2.</a:t>
+            </a:r>
+            <a:r>
+              <a:rPr lang="zh-CN" altLang="en-US" dirty="0" smtClean="0"/>
+              <a:t>击退特效由水波改成凤凰</a:t>
+            </a:r>
+            <a:endParaRPr lang="en-US" altLang="zh-CN" dirty="0" smtClean="0"/>
+          </a:p>
+          <a:p>
+            <a:r>
+              <a:rPr lang="en-US" altLang="zh-CN" dirty="0" smtClean="0"/>
+              <a:t>3.</a:t>
+            </a:r>
+          </a:p>
+        </p:txBody>
+      </p:sp>
+    </p:spTree>
+    <p:extLst>
+      <p:ext uri="{BB962C8B-B14F-4D97-AF65-F5344CB8AC3E}">
+        <p14:creationId xmlns:p14="http://schemas.microsoft.com/office/powerpoint/2010/main" val="2918144624"/>
+      </p:ext>
+    </p:extLst>
+  </p:cSld>
+  <p:clrMapOvr>
+    <a:masterClrMapping/>
+  </p:clrMapOvr>
+</p:sld>
+</file>
+
+<file path=ppt/slides/slide11.xml><?xml version="1.0" encoding="utf-8"?>
+<p:sld xmlns:a="http://schemas.openxmlformats.org/drawingml/2006/main" xmlns:r="http://schemas.openxmlformats.org/officeDocument/2006/relationships" xmlns:p="http://schemas.openxmlformats.org/presentationml/2006/main">
+  <p:cSld>
+    <p:spTree>
+      <p:nvGrpSpPr>
+        <p:cNvPr id="1" name=""/>
+        <p:cNvGrpSpPr/>
+        <p:nvPr/>
+      </p:nvGrpSpPr>
+      <p:grpSpPr>
+        <a:xfrm>
+          <a:off x="0" y="0"/>
+          <a:ext cx="0" cy="0"/>
+          <a:chOff x="0" y="0"/>
+          <a:chExt cx="0" cy="0"/>
+        </a:xfrm>
+      </p:grpSpPr>
+      <p:sp>
+        <p:nvSpPr>
+          <p:cNvPr id="2" name="标题 1"/>
+          <p:cNvSpPr>
+            <a:spLocks noGrp="1"/>
+          </p:cNvSpPr>
+          <p:nvPr>
+            <p:ph type="title"/>
+          </p:nvPr>
+        </p:nvSpPr>
+        <p:spPr/>
+        <p:txBody>
+          <a:bodyPr/>
+          <a:lstStyle/>
+          <a:p>
+            <a:endParaRPr lang="zh-CN" altLang="en-US" dirty="0"/>
+          </a:p>
+        </p:txBody>
+      </p:sp>
+      <p:sp>
+        <p:nvSpPr>
+          <p:cNvPr id="3" name="内容占位符 2"/>
+          <p:cNvSpPr>
+            <a:spLocks noGrp="1"/>
+          </p:cNvSpPr>
+          <p:nvPr>
+            <p:ph idx="1"/>
+          </p:nvPr>
+        </p:nvSpPr>
+        <p:spPr/>
+        <p:txBody>
+          <a:bodyPr/>
+          <a:lstStyle/>
+          <a:p>
+            <a:endParaRPr lang="zh-CN" altLang="en-US"/>
+          </a:p>
+        </p:txBody>
+      </p:sp>
+    </p:spTree>
+    <p:extLst>
+      <p:ext uri="{BB962C8B-B14F-4D97-AF65-F5344CB8AC3E}">
+        <p14:creationId xmlns:p14="http://schemas.microsoft.com/office/powerpoint/2010/main" val="1682913002"/>
+      </p:ext>
+    </p:extLst>
+  </p:cSld>
+  <p:clrMapOvr>
+    <a:masterClrMapping/>
+  </p:clrMapOvr>
+</p:sld>
+</file>
+
 <file path=ppt/slides/slide2.xml><?xml version="1.0" encoding="utf-8"?>
 <p:sld xmlns:a="http://schemas.openxmlformats.org/drawingml/2006/main" xmlns:r="http://schemas.openxmlformats.org/officeDocument/2006/relationships" xmlns:p="http://schemas.openxmlformats.org/presentationml/2006/main">
   <p:cSld>
@@ -3350,18 +3540,34 @@
           <a:lstStyle/>
           <a:p>
             <a:r>
-              <a:rPr lang="zh-CN" altLang="en-US" dirty="0"/>
+              <a:rPr lang="zh-CN" altLang="en-US" dirty="0">
+                <a:solidFill>
+                  <a:srgbClr val="FF0000"/>
+                </a:solidFill>
+              </a:rPr>
               <a:t>二</a:t>
             </a:r>
             <a:r>
-              <a:rPr lang="zh-CN" altLang="en-US" dirty="0" smtClean="0"/>
+              <a:rPr lang="zh-CN" altLang="en-US" dirty="0" smtClean="0">
+                <a:solidFill>
+                  <a:srgbClr val="FF0000"/>
+                </a:solidFill>
+              </a:rPr>
               <a:t>、游戏商</a:t>
             </a:r>
             <a:r>
-              <a:rPr lang="zh-CN" altLang="en-US" dirty="0" smtClean="0"/>
-              <a:t>城（此功能以完成）</a:t>
-            </a:r>
-            <a:endParaRPr lang="zh-CN" altLang="en-US" dirty="0"/>
+              <a:rPr lang="zh-CN" altLang="en-US" dirty="0" smtClean="0">
+                <a:solidFill>
+                  <a:srgbClr val="FF0000"/>
+                </a:solidFill>
+              </a:rPr>
+              <a:t>城</a:t>
+            </a:r>
+            <a:endParaRPr lang="zh-CN" altLang="en-US" dirty="0">
+              <a:solidFill>
+                <a:srgbClr val="FF0000"/>
+              </a:solidFill>
+            </a:endParaRPr>
           </a:p>
         </p:txBody>
       </p:sp>
@@ -3496,415 +3702,80 @@
           </a:p>
         </p:txBody>
       </p:sp>
-      <p:graphicFrame>
-        <p:nvGraphicFramePr>
-          <p:cNvPr id="6" name="表格 5"/>
-          <p:cNvGraphicFramePr>
-            <a:graphicFrameLocks noGrp="1"/>
-          </p:cNvGraphicFramePr>
-          <p:nvPr>
-            <p:extLst>
-              <p:ext uri="{D42A27DB-BD31-4B8C-83A1-F6EECF244321}">
-                <p14:modId xmlns:p14="http://schemas.microsoft.com/office/powerpoint/2010/main" val="437006865"/>
-              </p:ext>
-            </p:extLst>
-          </p:nvPr>
-        </p:nvGraphicFramePr>
-        <p:xfrm>
-          <a:off x="4499992" y="3645024"/>
-          <a:ext cx="4104456" cy="2595880"/>
-        </p:xfrm>
-        <a:graphic>
-          <a:graphicData uri="http://schemas.openxmlformats.org/drawingml/2006/table">
-            <a:tbl>
-              <a:tblPr firstRow="1" bandRow="1">
-                <a:tableStyleId>{5C22544A-7EE6-4342-B048-85BDC9FD1C3A}</a:tableStyleId>
-              </a:tblPr>
-              <a:tblGrid>
-                <a:gridCol w="1368152"/>
-                <a:gridCol w="1368152"/>
-                <a:gridCol w="1368152"/>
-              </a:tblGrid>
-              <a:tr h="370840">
-                <a:tc>
-                  <a:txBody>
-                    <a:bodyPr/>
-                    <a:lstStyle/>
-                    <a:p>
-                      <a:r>
-                        <a:rPr lang="zh-CN" altLang="en-US" dirty="0" smtClean="0"/>
-                        <a:t>道具</a:t>
-                      </a:r>
-                      <a:endParaRPr lang="zh-CN" altLang="en-US" dirty="0"/>
-                    </a:p>
-                  </a:txBody>
-                  <a:tcPr/>
-                </a:tc>
-                <a:tc>
-                  <a:txBody>
-                    <a:bodyPr/>
-                    <a:lstStyle/>
-                    <a:p>
-                      <a:r>
-                        <a:rPr lang="zh-CN" altLang="en-US" dirty="0" smtClean="0"/>
-                        <a:t>增强</a:t>
-                      </a:r>
-                      <a:endParaRPr lang="zh-CN" altLang="en-US" dirty="0"/>
-                    </a:p>
-                  </a:txBody>
-                  <a:tcPr/>
-                </a:tc>
-                <a:tc>
-                  <a:txBody>
-                    <a:bodyPr/>
-                    <a:lstStyle/>
-                    <a:p>
-                      <a:r>
-                        <a:rPr lang="zh-CN" altLang="en-US" dirty="0" smtClean="0"/>
-                        <a:t>购买</a:t>
-                      </a:r>
-                      <a:endParaRPr lang="zh-CN" altLang="en-US" dirty="0"/>
-                    </a:p>
-                  </a:txBody>
-                  <a:tcPr/>
-                </a:tc>
-              </a:tr>
-              <a:tr h="370840">
-                <a:tc>
-                  <a:txBody>
-                    <a:bodyPr/>
-                    <a:lstStyle/>
-                    <a:p>
-                      <a:r>
-                        <a:rPr lang="zh-CN" altLang="en-US" dirty="0" smtClean="0"/>
-                        <a:t>彩球</a:t>
-                      </a:r>
-                      <a:endParaRPr lang="zh-CN" altLang="en-US" dirty="0"/>
-                    </a:p>
-                  </a:txBody>
-                  <a:tcPr/>
-                </a:tc>
-                <a:tc>
-                  <a:txBody>
-                    <a:bodyPr/>
-                    <a:lstStyle/>
-                    <a:p>
-                      <a:r>
-                        <a:rPr lang="en-US" altLang="zh-CN" dirty="0" smtClean="0"/>
-                        <a:t>320</a:t>
-                      </a:r>
-                      <a:endParaRPr lang="zh-CN" altLang="en-US" dirty="0"/>
-                    </a:p>
-                  </a:txBody>
-                  <a:tcPr/>
-                </a:tc>
-                <a:tc>
-                  <a:txBody>
-                    <a:bodyPr/>
-                    <a:lstStyle/>
-                    <a:p>
-                      <a:r>
-                        <a:rPr lang="en-US" altLang="zh-CN" dirty="0" smtClean="0"/>
-                        <a:t>240</a:t>
-                      </a:r>
-                      <a:endParaRPr lang="zh-CN" altLang="en-US" dirty="0"/>
-                    </a:p>
-                  </a:txBody>
-                  <a:tcPr/>
-                </a:tc>
-              </a:tr>
-              <a:tr h="370840">
-                <a:tc>
-                  <a:txBody>
-                    <a:bodyPr/>
-                    <a:lstStyle/>
-                    <a:p>
-                      <a:r>
-                        <a:rPr lang="zh-CN" altLang="en-US" dirty="0" smtClean="0"/>
-                        <a:t>炸弹</a:t>
-                      </a:r>
-                      <a:endParaRPr lang="zh-CN" altLang="en-US" dirty="0"/>
-                    </a:p>
-                  </a:txBody>
-                  <a:tcPr/>
-                </a:tc>
-                <a:tc>
-                  <a:txBody>
-                    <a:bodyPr/>
-                    <a:lstStyle/>
-                    <a:p>
-                      <a:r>
-                        <a:rPr lang="en-US" altLang="zh-CN" dirty="0" smtClean="0"/>
-                        <a:t>480</a:t>
-                      </a:r>
-                      <a:endParaRPr lang="zh-CN" altLang="en-US" dirty="0"/>
-                    </a:p>
-                  </a:txBody>
-                  <a:tcPr/>
-                </a:tc>
-                <a:tc>
-                  <a:txBody>
-                    <a:bodyPr/>
-                    <a:lstStyle/>
-                    <a:p>
-                      <a:r>
-                        <a:rPr lang="en-US" altLang="zh-CN" dirty="0" smtClean="0"/>
-                        <a:t>360</a:t>
-                      </a:r>
-                      <a:endParaRPr lang="zh-CN" altLang="en-US" dirty="0"/>
-                    </a:p>
-                  </a:txBody>
-                  <a:tcPr/>
-                </a:tc>
-              </a:tr>
-              <a:tr h="370840">
-                <a:tc>
-                  <a:txBody>
-                    <a:bodyPr/>
-                    <a:lstStyle/>
-                    <a:p>
-                      <a:r>
-                        <a:rPr lang="zh-CN" altLang="en-US" dirty="0" smtClean="0"/>
-                        <a:t>钢球</a:t>
-                      </a:r>
-                      <a:endParaRPr lang="zh-CN" altLang="en-US" dirty="0"/>
-                    </a:p>
-                  </a:txBody>
-                  <a:tcPr/>
-                </a:tc>
-                <a:tc>
-                  <a:txBody>
-                    <a:bodyPr/>
-                    <a:lstStyle/>
-                    <a:p>
-                      <a:r>
-                        <a:rPr lang="en-US" altLang="zh-CN" dirty="0" smtClean="0"/>
-                        <a:t>480</a:t>
-                      </a:r>
-                      <a:endParaRPr lang="zh-CN" altLang="en-US" dirty="0"/>
-                    </a:p>
-                  </a:txBody>
-                  <a:tcPr/>
-                </a:tc>
-                <a:tc>
-                  <a:txBody>
-                    <a:bodyPr/>
-                    <a:lstStyle/>
-                    <a:p>
-                      <a:pPr marL="0" marR="0" indent="0" algn="l" defTabSz="914400" rtl="0" eaLnBrk="1" fontAlgn="auto" latinLnBrk="0" hangingPunct="1">
-                        <a:lnSpc>
-                          <a:spcPct val="100000"/>
-                        </a:lnSpc>
-                        <a:spcBef>
-                          <a:spcPts val="0"/>
-                        </a:spcBef>
-                        <a:spcAft>
-                          <a:spcPts val="0"/>
-                        </a:spcAft>
-                        <a:buClrTx/>
-                        <a:buSzTx/>
-                        <a:buFontTx/>
-                        <a:buNone/>
-                        <a:tabLst/>
-                        <a:defRPr/>
-                      </a:pPr>
-                      <a:r>
-                        <a:rPr lang="en-US" altLang="zh-CN" dirty="0" smtClean="0"/>
-                        <a:t>360</a:t>
-                      </a:r>
-                      <a:endParaRPr lang="zh-CN" altLang="en-US" dirty="0" smtClean="0"/>
-                    </a:p>
-                  </a:txBody>
-                  <a:tcPr/>
-                </a:tc>
-              </a:tr>
-              <a:tr h="370840">
-                <a:tc>
-                  <a:txBody>
-                    <a:bodyPr/>
-                    <a:lstStyle/>
-                    <a:p>
-                      <a:r>
-                        <a:rPr lang="zh-CN" altLang="en-US" dirty="0" smtClean="0"/>
-                        <a:t>冰球</a:t>
-                      </a:r>
-                      <a:endParaRPr lang="zh-CN" altLang="en-US" dirty="0"/>
-                    </a:p>
-                  </a:txBody>
-                  <a:tcPr/>
-                </a:tc>
-                <a:tc>
-                  <a:txBody>
-                    <a:bodyPr/>
-                    <a:lstStyle/>
-                    <a:p>
-                      <a:r>
-                        <a:rPr lang="en-US" altLang="zh-CN" dirty="0" smtClean="0"/>
-                        <a:t>480</a:t>
-                      </a:r>
-                      <a:endParaRPr lang="zh-CN" altLang="en-US" dirty="0"/>
-                    </a:p>
-                  </a:txBody>
-                  <a:tcPr/>
-                </a:tc>
-                <a:tc>
-                  <a:txBody>
-                    <a:bodyPr/>
-                    <a:lstStyle/>
-                    <a:p>
-                      <a:pPr marL="0" marR="0" indent="0" algn="l" defTabSz="914400" rtl="0" eaLnBrk="1" fontAlgn="auto" latinLnBrk="0" hangingPunct="1">
-                        <a:lnSpc>
-                          <a:spcPct val="100000"/>
-                        </a:lnSpc>
-                        <a:spcBef>
-                          <a:spcPts val="0"/>
-                        </a:spcBef>
-                        <a:spcAft>
-                          <a:spcPts val="0"/>
-                        </a:spcAft>
-                        <a:buClrTx/>
-                        <a:buSzTx/>
-                        <a:buFontTx/>
-                        <a:buNone/>
-                        <a:tabLst/>
-                        <a:defRPr/>
-                      </a:pPr>
-                      <a:r>
-                        <a:rPr lang="en-US" altLang="zh-CN" dirty="0" smtClean="0"/>
-                        <a:t>240</a:t>
-                      </a:r>
-                      <a:endParaRPr lang="zh-CN" altLang="en-US" dirty="0" smtClean="0"/>
-                    </a:p>
-                  </a:txBody>
-                  <a:tcPr/>
-                </a:tc>
-              </a:tr>
-              <a:tr h="370840">
-                <a:tc>
-                  <a:txBody>
-                    <a:bodyPr/>
-                    <a:lstStyle/>
-                    <a:p>
-                      <a:r>
-                        <a:rPr lang="zh-CN" altLang="en-US" dirty="0" smtClean="0"/>
-                        <a:t>魔法球</a:t>
-                      </a:r>
-                      <a:endParaRPr lang="zh-CN" altLang="en-US" dirty="0"/>
-                    </a:p>
-                  </a:txBody>
-                  <a:tcPr/>
-                </a:tc>
-                <a:tc>
-                  <a:txBody>
-                    <a:bodyPr/>
-                    <a:lstStyle/>
-                    <a:p>
-                      <a:r>
-                        <a:rPr lang="en-US" altLang="zh-CN" dirty="0" smtClean="0"/>
-                        <a:t>480</a:t>
-                      </a:r>
-                      <a:endParaRPr lang="zh-CN" altLang="en-US" dirty="0"/>
-                    </a:p>
-                  </a:txBody>
-                  <a:tcPr/>
-                </a:tc>
-                <a:tc>
-                  <a:txBody>
-                    <a:bodyPr/>
-                    <a:lstStyle/>
-                    <a:p>
-                      <a:pPr marL="0" marR="0" indent="0" algn="l" defTabSz="914400" rtl="0" eaLnBrk="1" fontAlgn="auto" latinLnBrk="0" hangingPunct="1">
-                        <a:lnSpc>
-                          <a:spcPct val="100000"/>
-                        </a:lnSpc>
-                        <a:spcBef>
-                          <a:spcPts val="0"/>
-                        </a:spcBef>
-                        <a:spcAft>
-                          <a:spcPts val="0"/>
-                        </a:spcAft>
-                        <a:buClrTx/>
-                        <a:buSzTx/>
-                        <a:buFontTx/>
-                        <a:buNone/>
-                        <a:tabLst/>
-                        <a:defRPr/>
-                      </a:pPr>
-                      <a:r>
-                        <a:rPr lang="en-US" altLang="zh-CN" dirty="0" smtClean="0"/>
-                        <a:t>480</a:t>
-                      </a:r>
-                      <a:endParaRPr lang="zh-CN" altLang="en-US" dirty="0" smtClean="0"/>
-                    </a:p>
-                  </a:txBody>
-                  <a:tcPr/>
-                </a:tc>
-              </a:tr>
-              <a:tr h="370840">
-                <a:tc>
-                  <a:txBody>
-                    <a:bodyPr/>
-                    <a:lstStyle/>
-                    <a:p>
-                      <a:r>
-                        <a:rPr lang="zh-CN" altLang="en-US" dirty="0" smtClean="0"/>
-                        <a:t>击退球</a:t>
-                      </a:r>
-                      <a:endParaRPr lang="zh-CN" altLang="en-US" dirty="0"/>
-                    </a:p>
-                  </a:txBody>
-                  <a:tcPr/>
-                </a:tc>
-                <a:tc>
-                  <a:txBody>
-                    <a:bodyPr/>
-                    <a:lstStyle/>
-                    <a:p>
-                      <a:r>
-                        <a:rPr lang="en-US" altLang="zh-CN" dirty="0" smtClean="0"/>
-                        <a:t>480</a:t>
-                      </a:r>
-                      <a:endParaRPr lang="zh-CN" altLang="en-US" dirty="0"/>
-                    </a:p>
-                  </a:txBody>
-                  <a:tcPr/>
-                </a:tc>
-                <a:tc>
-                  <a:txBody>
-                    <a:bodyPr/>
-                    <a:lstStyle/>
-                    <a:p>
-                      <a:pPr marL="0" marR="0" indent="0" algn="l" defTabSz="914400" rtl="0" eaLnBrk="1" fontAlgn="auto" latinLnBrk="0" hangingPunct="1">
-                        <a:lnSpc>
-                          <a:spcPct val="100000"/>
-                        </a:lnSpc>
-                        <a:spcBef>
-                          <a:spcPts val="0"/>
-                        </a:spcBef>
-                        <a:spcAft>
-                          <a:spcPts val="0"/>
-                        </a:spcAft>
-                        <a:buClrTx/>
-                        <a:buSzTx/>
-                        <a:buFontTx/>
-                        <a:buNone/>
-                        <a:tabLst/>
-                        <a:defRPr/>
-                      </a:pPr>
-                      <a:r>
-                        <a:rPr lang="en-US" altLang="zh-CN" dirty="0" smtClean="0"/>
-                        <a:t>360</a:t>
-                      </a:r>
-                      <a:endParaRPr lang="zh-CN" altLang="en-US" dirty="0" smtClean="0"/>
-                    </a:p>
-                  </a:txBody>
-                  <a:tcPr/>
-                </a:tc>
-              </a:tr>
-            </a:tbl>
-          </a:graphicData>
-        </a:graphic>
-      </p:graphicFrame>
+      <p:sp>
+        <p:nvSpPr>
+          <p:cNvPr id="7" name="TextBox 6"/>
+          <p:cNvSpPr txBox="1"/>
+          <p:nvPr/>
+        </p:nvSpPr>
+        <p:spPr>
+          <a:xfrm>
+            <a:off x="4358172" y="3645024"/>
+            <a:ext cx="4248472" cy="1200329"/>
+          </a:xfrm>
+          <a:prstGeom prst="rect">
+            <a:avLst/>
+          </a:prstGeom>
+          <a:noFill/>
+        </p:spPr>
+        <p:txBody>
+          <a:bodyPr wrap="square" rtlCol="0">
+            <a:spAutoFit/>
+          </a:bodyPr>
+          <a:lstStyle/>
+          <a:p>
+            <a:r>
+              <a:rPr lang="en-US" altLang="zh-CN" dirty="0" smtClean="0"/>
+              <a:t>2014-10-15 </a:t>
+            </a:r>
+            <a:r>
+              <a:rPr lang="zh-CN" altLang="en-US" dirty="0" smtClean="0"/>
+              <a:t>陈奕静</a:t>
+            </a:r>
+            <a:endParaRPr lang="en-US" altLang="zh-CN" dirty="0" smtClean="0"/>
+          </a:p>
+          <a:p>
+            <a:r>
+              <a:rPr lang="en-US" altLang="zh-CN" dirty="0" smtClean="0"/>
+              <a:t>1.</a:t>
+            </a:r>
+            <a:r>
+              <a:rPr lang="zh-CN" altLang="en-US" dirty="0" smtClean="0"/>
+              <a:t>将次界面变成选项卡模式</a:t>
+            </a:r>
+            <a:endParaRPr lang="en-US" altLang="zh-CN" dirty="0" smtClean="0"/>
+          </a:p>
+          <a:p>
+            <a:r>
+              <a:rPr lang="en-US" altLang="zh-CN" dirty="0" smtClean="0"/>
+              <a:t>1.1</a:t>
+            </a:r>
+            <a:r>
+              <a:rPr lang="zh-CN" altLang="en-US" dirty="0" smtClean="0"/>
+              <a:t>普通购买列表</a:t>
+            </a:r>
+            <a:r>
+              <a:rPr lang="en-US" altLang="zh-CN" dirty="0" smtClean="0"/>
+              <a:t>【】</a:t>
+            </a:r>
+          </a:p>
+          <a:p>
+            <a:r>
+              <a:rPr lang="en-US" altLang="zh-CN" dirty="0" smtClean="0"/>
+              <a:t>1.2</a:t>
+            </a:r>
+            <a:r>
+              <a:rPr lang="zh-CN" altLang="en-US" dirty="0" smtClean="0"/>
+              <a:t>打包购买列表</a:t>
+            </a:r>
+            <a:r>
+              <a:rPr lang="en-US" altLang="zh-CN" dirty="0" smtClean="0"/>
+              <a:t>【】</a:t>
+            </a:r>
+            <a:endParaRPr lang="zh-CN" altLang="en-US" dirty="0"/>
+          </a:p>
+        </p:txBody>
+      </p:sp>
     </p:spTree>
     <p:extLst>
       <p:ext uri="{BB962C8B-B14F-4D97-AF65-F5344CB8AC3E}">
@@ -3961,11 +3832,7 @@
             </a:r>
             <a:r>
               <a:rPr lang="zh-CN" altLang="en-US" dirty="0" smtClean="0"/>
-              <a:t>、游戏</a:t>
-            </a:r>
-            <a:r>
-              <a:rPr lang="zh-CN" altLang="en-US" dirty="0" smtClean="0"/>
-              <a:t>内主动使用道具</a:t>
+              <a:t>、游戏内主动使用道具</a:t>
             </a:r>
             <a:endParaRPr lang="zh-CN" altLang="en-US" dirty="0"/>
           </a:p>
@@ -5462,22 +5329,42 @@
           <a:lstStyle/>
           <a:p>
             <a:r>
-              <a:rPr lang="zh-CN" altLang="en-US" dirty="0"/>
+              <a:rPr lang="zh-CN" altLang="en-US" dirty="0">
+                <a:solidFill>
+                  <a:srgbClr val="FF0000"/>
+                </a:solidFill>
+              </a:rPr>
               <a:t>七</a:t>
             </a:r>
             <a:r>
-              <a:rPr lang="zh-CN" altLang="en-US" dirty="0" smtClean="0"/>
+              <a:rPr lang="zh-CN" altLang="en-US" dirty="0" smtClean="0">
+                <a:solidFill>
+                  <a:srgbClr val="FF0000"/>
+                </a:solidFill>
+              </a:rPr>
               <a:t>、账户</a:t>
             </a:r>
             <a:r>
-              <a:rPr lang="en-US" altLang="zh-CN" dirty="0" smtClean="0"/>
+              <a:rPr lang="en-US" altLang="zh-CN" dirty="0" smtClean="0">
+                <a:solidFill>
+                  <a:srgbClr val="FF0000"/>
+                </a:solidFill>
+              </a:rPr>
               <a:t>/</a:t>
             </a:r>
             <a:r>
-              <a:rPr lang="zh-CN" altLang="en-US" dirty="0" smtClean="0"/>
+              <a:rPr lang="zh-CN" altLang="en-US" dirty="0" smtClean="0">
+                <a:solidFill>
+                  <a:srgbClr val="FF0000"/>
+                </a:solidFill>
+              </a:rPr>
               <a:t>排行榜系统</a:t>
             </a:r>
-            <a:endParaRPr lang="zh-CN" altLang="en-US" dirty="0"/>
+            <a:endParaRPr lang="zh-CN" altLang="en-US" dirty="0">
+              <a:solidFill>
+                <a:srgbClr val="FF0000"/>
+              </a:solidFill>
+            </a:endParaRPr>
           </a:p>
         </p:txBody>
       </p:sp>
@@ -5605,6 +5492,92 @@
               <a:t>用户可以给好友赠送体力或者向好友所有体力，所得的体力存在邮件中</a:t>
             </a:r>
             <a:endParaRPr lang="en-US" altLang="zh-CN" dirty="0" smtClean="0"/>
+          </a:p>
+        </p:txBody>
+      </p:sp>
+      <p:sp>
+        <p:nvSpPr>
+          <p:cNvPr id="2" name="TextBox 1"/>
+          <p:cNvSpPr txBox="1"/>
+          <p:nvPr/>
+        </p:nvSpPr>
+        <p:spPr>
+          <a:xfrm>
+            <a:off x="395536" y="1101092"/>
+            <a:ext cx="3312368" cy="1477328"/>
+          </a:xfrm>
+          <a:prstGeom prst="rect">
+            <a:avLst/>
+          </a:prstGeom>
+          <a:noFill/>
+        </p:spPr>
+        <p:txBody>
+          <a:bodyPr wrap="square" rtlCol="0">
+            <a:spAutoFit/>
+          </a:bodyPr>
+          <a:lstStyle/>
+          <a:p>
+            <a:r>
+              <a:rPr lang="en-US" altLang="zh-CN" dirty="0" smtClean="0"/>
+              <a:t>2014-10-15 </a:t>
+            </a:r>
+            <a:r>
+              <a:rPr lang="zh-CN" altLang="en-US" dirty="0" smtClean="0"/>
+              <a:t>陈奕静</a:t>
+            </a:r>
+            <a:endParaRPr lang="en-US" altLang="zh-CN" dirty="0" smtClean="0"/>
+          </a:p>
+          <a:p>
+            <a:r>
+              <a:rPr lang="en-US" altLang="zh-CN" dirty="0" smtClean="0"/>
+              <a:t>1.</a:t>
+            </a:r>
+            <a:r>
+              <a:rPr lang="zh-CN" altLang="en-US" dirty="0" smtClean="0"/>
+              <a:t>接入</a:t>
+            </a:r>
+            <a:r>
+              <a:rPr lang="en-US" altLang="zh-CN" dirty="0" smtClean="0"/>
+              <a:t>QQ</a:t>
+            </a:r>
+            <a:r>
+              <a:rPr lang="zh-CN" altLang="en-US" dirty="0" smtClean="0"/>
+              <a:t>登陆</a:t>
+            </a:r>
+            <a:endParaRPr lang="en-US" altLang="zh-CN" dirty="0" smtClean="0"/>
+          </a:p>
+          <a:p>
+            <a:r>
+              <a:rPr lang="en-US" altLang="zh-CN" dirty="0" smtClean="0"/>
+              <a:t>2.</a:t>
+            </a:r>
+            <a:r>
+              <a:rPr lang="zh-CN" altLang="en-US" dirty="0" smtClean="0"/>
+              <a:t>开发本地服务器</a:t>
+            </a:r>
+            <a:endParaRPr lang="en-US" altLang="zh-CN" dirty="0" smtClean="0"/>
+          </a:p>
+          <a:p>
+            <a:r>
+              <a:rPr lang="en-US" altLang="zh-CN" dirty="0" smtClean="0"/>
+              <a:t>3.</a:t>
+            </a:r>
+            <a:r>
+              <a:rPr lang="zh-CN" altLang="en-US" dirty="0" smtClean="0"/>
+              <a:t>同步用户手机数据到本地</a:t>
+            </a:r>
+            <a:endParaRPr lang="en-US" altLang="zh-CN" dirty="0" smtClean="0"/>
+          </a:p>
+          <a:p>
+            <a:r>
+              <a:rPr lang="en-US" altLang="zh-CN" dirty="0" smtClean="0"/>
+              <a:t>4.</a:t>
+            </a:r>
+            <a:r>
+              <a:rPr lang="zh-CN" altLang="en-US" dirty="0" smtClean="0"/>
+              <a:t>生成用户唯一识别码</a:t>
+            </a:r>
+            <a:endParaRPr lang="zh-CN" altLang="en-US" dirty="0"/>
           </a:p>
         </p:txBody>
       </p:sp>
@@ -5674,7 +5647,6 @@
               <a:rPr lang="zh-CN" altLang="en-US" dirty="0"/>
               <a:t>评分</a:t>
             </a:r>
-            <a:endParaRPr lang="zh-CN" altLang="en-US" dirty="0"/>
           </a:p>
         </p:txBody>
       </p:sp>

</xml_diff>